<commit_message>
fix bug in Red Color
</commit_message>
<xml_diff>
--- a/scripts/Drone_Cam_Proj.pptx
+++ b/scripts/Drone_Cam_Proj.pptx
@@ -272,7 +272,7 @@
           <a:p>
             <a:fld id="{9AE3A2BE-59ED-49A3-AA69-60BB8DC8DF8C}" type="datetimeFigureOut">
               <a:rPr lang="he-IL" smtClean="0"/>
-              <a:t>ט"ו/תשרי/תשפ"ב</a:t>
+              <a:t>י"ז/תשרי/תשפ"ב</a:t>
             </a:fld>
             <a:endParaRPr lang="he-IL"/>
           </a:p>
@@ -470,7 +470,7 @@
           <a:p>
             <a:fld id="{9AE3A2BE-59ED-49A3-AA69-60BB8DC8DF8C}" type="datetimeFigureOut">
               <a:rPr lang="he-IL" smtClean="0"/>
-              <a:t>ט"ו/תשרי/תשפ"ב</a:t>
+              <a:t>י"ז/תשרי/תשפ"ב</a:t>
             </a:fld>
             <a:endParaRPr lang="he-IL"/>
           </a:p>
@@ -678,7 +678,7 @@
           <a:p>
             <a:fld id="{9AE3A2BE-59ED-49A3-AA69-60BB8DC8DF8C}" type="datetimeFigureOut">
               <a:rPr lang="he-IL" smtClean="0"/>
-              <a:t>ט"ו/תשרי/תשפ"ב</a:t>
+              <a:t>י"ז/תשרי/תשפ"ב</a:t>
             </a:fld>
             <a:endParaRPr lang="he-IL"/>
           </a:p>
@@ -876,7 +876,7 @@
           <a:p>
             <a:fld id="{9AE3A2BE-59ED-49A3-AA69-60BB8DC8DF8C}" type="datetimeFigureOut">
               <a:rPr lang="he-IL" smtClean="0"/>
-              <a:t>ט"ו/תשרי/תשפ"ב</a:t>
+              <a:t>י"ז/תשרי/תשפ"ב</a:t>
             </a:fld>
             <a:endParaRPr lang="he-IL"/>
           </a:p>
@@ -1151,7 +1151,7 @@
           <a:p>
             <a:fld id="{9AE3A2BE-59ED-49A3-AA69-60BB8DC8DF8C}" type="datetimeFigureOut">
               <a:rPr lang="he-IL" smtClean="0"/>
-              <a:t>ט"ו/תשרי/תשפ"ב</a:t>
+              <a:t>י"ז/תשרי/תשפ"ב</a:t>
             </a:fld>
             <a:endParaRPr lang="he-IL"/>
           </a:p>
@@ -1416,7 +1416,7 @@
           <a:p>
             <a:fld id="{9AE3A2BE-59ED-49A3-AA69-60BB8DC8DF8C}" type="datetimeFigureOut">
               <a:rPr lang="he-IL" smtClean="0"/>
-              <a:t>ט"ו/תשרי/תשפ"ב</a:t>
+              <a:t>י"ז/תשרי/תשפ"ב</a:t>
             </a:fld>
             <a:endParaRPr lang="he-IL"/>
           </a:p>
@@ -1828,7 +1828,7 @@
           <a:p>
             <a:fld id="{9AE3A2BE-59ED-49A3-AA69-60BB8DC8DF8C}" type="datetimeFigureOut">
               <a:rPr lang="he-IL" smtClean="0"/>
-              <a:t>ט"ו/תשרי/תשפ"ב</a:t>
+              <a:t>י"ז/תשרי/תשפ"ב</a:t>
             </a:fld>
             <a:endParaRPr lang="he-IL"/>
           </a:p>
@@ -1969,7 +1969,7 @@
           <a:p>
             <a:fld id="{9AE3A2BE-59ED-49A3-AA69-60BB8DC8DF8C}" type="datetimeFigureOut">
               <a:rPr lang="he-IL" smtClean="0"/>
-              <a:t>ט"ו/תשרי/תשפ"ב</a:t>
+              <a:t>י"ז/תשרי/תשפ"ב</a:t>
             </a:fld>
             <a:endParaRPr lang="he-IL"/>
           </a:p>
@@ -2082,7 +2082,7 @@
           <a:p>
             <a:fld id="{9AE3A2BE-59ED-49A3-AA69-60BB8DC8DF8C}" type="datetimeFigureOut">
               <a:rPr lang="he-IL" smtClean="0"/>
-              <a:t>ט"ו/תשרי/תשפ"ב</a:t>
+              <a:t>י"ז/תשרי/תשפ"ב</a:t>
             </a:fld>
             <a:endParaRPr lang="he-IL"/>
           </a:p>
@@ -2393,7 +2393,7 @@
           <a:p>
             <a:fld id="{9AE3A2BE-59ED-49A3-AA69-60BB8DC8DF8C}" type="datetimeFigureOut">
               <a:rPr lang="he-IL" smtClean="0"/>
-              <a:t>ט"ו/תשרי/תשפ"ב</a:t>
+              <a:t>י"ז/תשרי/תשפ"ב</a:t>
             </a:fld>
             <a:endParaRPr lang="he-IL"/>
           </a:p>
@@ -2681,7 +2681,7 @@
           <a:p>
             <a:fld id="{9AE3A2BE-59ED-49A3-AA69-60BB8DC8DF8C}" type="datetimeFigureOut">
               <a:rPr lang="he-IL" smtClean="0"/>
-              <a:t>ט"ו/תשרי/תשפ"ב</a:t>
+              <a:t>י"ז/תשרי/תשפ"ב</a:t>
             </a:fld>
             <a:endParaRPr lang="he-IL"/>
           </a:p>
@@ -2922,7 +2922,7 @@
           <a:p>
             <a:fld id="{9AE3A2BE-59ED-49A3-AA69-60BB8DC8DF8C}" type="datetimeFigureOut">
               <a:rPr lang="he-IL" smtClean="0"/>
-              <a:t>ט"ו/תשרי/תשפ"ב</a:t>
+              <a:t>י"ז/תשרי/תשפ"ב</a:t>
             </a:fld>
             <a:endParaRPr lang="he-IL"/>
           </a:p>
@@ -19411,6 +19411,1546 @@
           </a:p>
         </p:txBody>
       </p:sp>
+      <p:sp>
+        <p:nvSpPr>
+          <p:cNvPr id="268" name="תיבת טקסט 196">
+            <a:extLst>
+              <a:ext uri="{FF2B5EF4-FFF2-40B4-BE49-F238E27FC236}">
+                <a16:creationId xmlns:a16="http://schemas.microsoft.com/office/drawing/2014/main" id="{235F0D8F-C289-4917-911A-5E6DDCA912FE}"/>
+              </a:ext>
+            </a:extLst>
+          </p:cNvPr>
+          <p:cNvSpPr txBox="1"/>
+          <p:nvPr/>
+        </p:nvSpPr>
+        <p:spPr>
+          <a:xfrm>
+            <a:off x="300630" y="2612231"/>
+            <a:ext cx="708848" cy="338554"/>
+          </a:xfrm>
+          <a:prstGeom prst="rect">
+            <a:avLst/>
+          </a:prstGeom>
+          <a:noFill/>
+        </p:spPr>
+        <p:txBody>
+          <a:bodyPr wrap="none" rtlCol="1">
+            <a:spAutoFit/>
+          </a:bodyPr>
+          <a:lstStyle/>
+          <a:p>
+            <a:r>
+              <a:rPr lang="en-US" sz="800" dirty="0" err="1"/>
+              <a:t>FraimSync</a:t>
+            </a:r>
+            <a:r>
+              <a:rPr lang="en-US" sz="800" dirty="0"/>
+              <a:t> 1</a:t>
+            </a:r>
+          </a:p>
+          <a:p>
+            <a:pPr algn="l" rtl="0"/>
+            <a:r>
+              <a:rPr lang="en-US" sz="800" dirty="0"/>
+              <a:t>Save Data 1</a:t>
+            </a:r>
+            <a:endParaRPr lang="he-IL" sz="800" dirty="0"/>
+          </a:p>
+        </p:txBody>
+      </p:sp>
+      <p:grpSp>
+        <p:nvGrpSpPr>
+          <p:cNvPr id="271" name="קבוצה 264">
+            <a:extLst>
+              <a:ext uri="{FF2B5EF4-FFF2-40B4-BE49-F238E27FC236}">
+                <a16:creationId xmlns:a16="http://schemas.microsoft.com/office/drawing/2014/main" id="{DFE73639-09A8-46EF-96BA-BE63BF87DFAD}"/>
+              </a:ext>
+            </a:extLst>
+          </p:cNvPr>
+          <p:cNvGrpSpPr/>
+          <p:nvPr/>
+        </p:nvGrpSpPr>
+        <p:grpSpPr>
+          <a:xfrm>
+            <a:off x="1094253" y="2827675"/>
+            <a:ext cx="1078706" cy="509584"/>
+            <a:chOff x="1031144" y="559589"/>
+            <a:chExt cx="1078706" cy="509584"/>
+          </a:xfrm>
+        </p:grpSpPr>
+        <p:sp>
+          <p:nvSpPr>
+            <p:cNvPr id="272" name="כוכב: 4 פינות 199">
+              <a:extLst>
+                <a:ext uri="{FF2B5EF4-FFF2-40B4-BE49-F238E27FC236}">
+                  <a16:creationId xmlns:a16="http://schemas.microsoft.com/office/drawing/2014/main" id="{917F7947-4A62-4B9B-AAF7-8553A7E3DD98}"/>
+                </a:ext>
+              </a:extLst>
+            </p:cNvPr>
+            <p:cNvSpPr/>
+            <p:nvPr/>
+          </p:nvSpPr>
+          <p:spPr>
+            <a:xfrm>
+              <a:off x="1031144" y="559590"/>
+              <a:ext cx="69056" cy="73819"/>
+            </a:xfrm>
+            <a:prstGeom prst="star4">
+              <a:avLst/>
+            </a:prstGeom>
+          </p:spPr>
+          <p:style>
+            <a:lnRef idx="2">
+              <a:schemeClr val="accent1">
+                <a:shade val="50000"/>
+              </a:schemeClr>
+            </a:lnRef>
+            <a:fillRef idx="1">
+              <a:schemeClr val="accent1"/>
+            </a:fillRef>
+            <a:effectRef idx="0">
+              <a:schemeClr val="accent1"/>
+            </a:effectRef>
+            <a:fontRef idx="minor">
+              <a:schemeClr val="lt1"/>
+            </a:fontRef>
+          </p:style>
+          <p:txBody>
+            <a:bodyPr rtlCol="1" anchor="ctr"/>
+            <a:lstStyle/>
+            <a:p>
+              <a:pPr algn="ctr"/>
+              <a:endParaRPr lang="he-IL"/>
+            </a:p>
+          </p:txBody>
+        </p:sp>
+        <p:sp>
+          <p:nvSpPr>
+            <p:cNvPr id="273" name="כוכב: 7 פינות 200">
+              <a:extLst>
+                <a:ext uri="{FF2B5EF4-FFF2-40B4-BE49-F238E27FC236}">
+                  <a16:creationId xmlns:a16="http://schemas.microsoft.com/office/drawing/2014/main" id="{AF057129-88F7-4DA5-8C62-2F797E55ADEB}"/>
+                </a:ext>
+              </a:extLst>
+            </p:cNvPr>
+            <p:cNvSpPr/>
+            <p:nvPr/>
+          </p:nvSpPr>
+          <p:spPr>
+            <a:xfrm>
+              <a:off x="1176401" y="559589"/>
+              <a:ext cx="69056" cy="73819"/>
+            </a:xfrm>
+            <a:prstGeom prst="star7">
+              <a:avLst/>
+            </a:prstGeom>
+          </p:spPr>
+          <p:style>
+            <a:lnRef idx="2">
+              <a:schemeClr val="accent1">
+                <a:shade val="50000"/>
+              </a:schemeClr>
+            </a:lnRef>
+            <a:fillRef idx="1">
+              <a:schemeClr val="accent1"/>
+            </a:fillRef>
+            <a:effectRef idx="0">
+              <a:schemeClr val="accent1"/>
+            </a:effectRef>
+            <a:fontRef idx="minor">
+              <a:schemeClr val="lt1"/>
+            </a:fontRef>
+          </p:style>
+          <p:txBody>
+            <a:bodyPr rtlCol="1" anchor="ctr"/>
+            <a:lstStyle/>
+            <a:p>
+              <a:pPr algn="ctr"/>
+              <a:endParaRPr lang="he-IL"/>
+            </a:p>
+          </p:txBody>
+        </p:sp>
+        <p:sp>
+          <p:nvSpPr>
+            <p:cNvPr id="275" name="כוכב: 4 פינות 201">
+              <a:extLst>
+                <a:ext uri="{FF2B5EF4-FFF2-40B4-BE49-F238E27FC236}">
+                  <a16:creationId xmlns:a16="http://schemas.microsoft.com/office/drawing/2014/main" id="{65C5A19E-9FEE-4177-9199-9F03EB76BB12}"/>
+                </a:ext>
+              </a:extLst>
+            </p:cNvPr>
+            <p:cNvSpPr/>
+            <p:nvPr/>
+          </p:nvSpPr>
+          <p:spPr>
+            <a:xfrm>
+              <a:off x="1319275" y="559590"/>
+              <a:ext cx="69056" cy="73819"/>
+            </a:xfrm>
+            <a:prstGeom prst="star4">
+              <a:avLst/>
+            </a:prstGeom>
+          </p:spPr>
+          <p:style>
+            <a:lnRef idx="2">
+              <a:schemeClr val="accent1">
+                <a:shade val="50000"/>
+              </a:schemeClr>
+            </a:lnRef>
+            <a:fillRef idx="1">
+              <a:schemeClr val="accent1"/>
+            </a:fillRef>
+            <a:effectRef idx="0">
+              <a:schemeClr val="accent1"/>
+            </a:effectRef>
+            <a:fontRef idx="minor">
+              <a:schemeClr val="lt1"/>
+            </a:fontRef>
+          </p:style>
+          <p:txBody>
+            <a:bodyPr rtlCol="1" anchor="ctr"/>
+            <a:lstStyle/>
+            <a:p>
+              <a:pPr algn="ctr"/>
+              <a:endParaRPr lang="he-IL"/>
+            </a:p>
+          </p:txBody>
+        </p:sp>
+        <p:sp>
+          <p:nvSpPr>
+            <p:cNvPr id="276" name="כוכב: 7 פינות 202">
+              <a:extLst>
+                <a:ext uri="{FF2B5EF4-FFF2-40B4-BE49-F238E27FC236}">
+                  <a16:creationId xmlns:a16="http://schemas.microsoft.com/office/drawing/2014/main" id="{01A9A3B7-7724-400E-A0AD-06CDF43A78FF}"/>
+                </a:ext>
+              </a:extLst>
+            </p:cNvPr>
+            <p:cNvSpPr/>
+            <p:nvPr/>
+          </p:nvSpPr>
+          <p:spPr>
+            <a:xfrm>
+              <a:off x="1464532" y="559589"/>
+              <a:ext cx="69056" cy="73819"/>
+            </a:xfrm>
+            <a:prstGeom prst="star7">
+              <a:avLst/>
+            </a:prstGeom>
+          </p:spPr>
+          <p:style>
+            <a:lnRef idx="2">
+              <a:schemeClr val="accent1">
+                <a:shade val="50000"/>
+              </a:schemeClr>
+            </a:lnRef>
+            <a:fillRef idx="1">
+              <a:schemeClr val="accent1"/>
+            </a:fillRef>
+            <a:effectRef idx="0">
+              <a:schemeClr val="accent1"/>
+            </a:effectRef>
+            <a:fontRef idx="minor">
+              <a:schemeClr val="lt1"/>
+            </a:fontRef>
+          </p:style>
+          <p:txBody>
+            <a:bodyPr rtlCol="1" anchor="ctr"/>
+            <a:lstStyle/>
+            <a:p>
+              <a:pPr algn="ctr"/>
+              <a:endParaRPr lang="he-IL"/>
+            </a:p>
+          </p:txBody>
+        </p:sp>
+        <p:sp>
+          <p:nvSpPr>
+            <p:cNvPr id="277" name="כוכב: 4 פינות 203">
+              <a:extLst>
+                <a:ext uri="{FF2B5EF4-FFF2-40B4-BE49-F238E27FC236}">
+                  <a16:creationId xmlns:a16="http://schemas.microsoft.com/office/drawing/2014/main" id="{2DA6A04F-C825-463A-886E-085E3775BDA7}"/>
+                </a:ext>
+              </a:extLst>
+            </p:cNvPr>
+            <p:cNvSpPr/>
+            <p:nvPr/>
+          </p:nvSpPr>
+          <p:spPr>
+            <a:xfrm>
+              <a:off x="1607406" y="559590"/>
+              <a:ext cx="69056" cy="73819"/>
+            </a:xfrm>
+            <a:prstGeom prst="star4">
+              <a:avLst/>
+            </a:prstGeom>
+          </p:spPr>
+          <p:style>
+            <a:lnRef idx="2">
+              <a:schemeClr val="accent1">
+                <a:shade val="50000"/>
+              </a:schemeClr>
+            </a:lnRef>
+            <a:fillRef idx="1">
+              <a:schemeClr val="accent1"/>
+            </a:fillRef>
+            <a:effectRef idx="0">
+              <a:schemeClr val="accent1"/>
+            </a:effectRef>
+            <a:fontRef idx="minor">
+              <a:schemeClr val="lt1"/>
+            </a:fontRef>
+          </p:style>
+          <p:txBody>
+            <a:bodyPr rtlCol="1" anchor="ctr"/>
+            <a:lstStyle/>
+            <a:p>
+              <a:pPr algn="ctr"/>
+              <a:endParaRPr lang="he-IL"/>
+            </a:p>
+          </p:txBody>
+        </p:sp>
+        <p:sp>
+          <p:nvSpPr>
+            <p:cNvPr id="278" name="כוכב: 7 פינות 204">
+              <a:extLst>
+                <a:ext uri="{FF2B5EF4-FFF2-40B4-BE49-F238E27FC236}">
+                  <a16:creationId xmlns:a16="http://schemas.microsoft.com/office/drawing/2014/main" id="{5759999D-60F4-41B5-AB3E-CF57D86E2B86}"/>
+                </a:ext>
+              </a:extLst>
+            </p:cNvPr>
+            <p:cNvSpPr/>
+            <p:nvPr/>
+          </p:nvSpPr>
+          <p:spPr>
+            <a:xfrm>
+              <a:off x="1752663" y="559589"/>
+              <a:ext cx="69056" cy="73819"/>
+            </a:xfrm>
+            <a:prstGeom prst="star7">
+              <a:avLst/>
+            </a:prstGeom>
+          </p:spPr>
+          <p:style>
+            <a:lnRef idx="2">
+              <a:schemeClr val="accent1">
+                <a:shade val="50000"/>
+              </a:schemeClr>
+            </a:lnRef>
+            <a:fillRef idx="1">
+              <a:schemeClr val="accent1"/>
+            </a:fillRef>
+            <a:effectRef idx="0">
+              <a:schemeClr val="accent1"/>
+            </a:effectRef>
+            <a:fontRef idx="minor">
+              <a:schemeClr val="lt1"/>
+            </a:fontRef>
+          </p:style>
+          <p:txBody>
+            <a:bodyPr rtlCol="1" anchor="ctr"/>
+            <a:lstStyle/>
+            <a:p>
+              <a:pPr algn="ctr"/>
+              <a:endParaRPr lang="he-IL"/>
+            </a:p>
+          </p:txBody>
+        </p:sp>
+        <p:sp>
+          <p:nvSpPr>
+            <p:cNvPr id="279" name="כוכב: 4 פינות 205">
+              <a:extLst>
+                <a:ext uri="{FF2B5EF4-FFF2-40B4-BE49-F238E27FC236}">
+                  <a16:creationId xmlns:a16="http://schemas.microsoft.com/office/drawing/2014/main" id="{9A300306-14DE-40FF-9944-5704D589FC89}"/>
+                </a:ext>
+              </a:extLst>
+            </p:cNvPr>
+            <p:cNvSpPr/>
+            <p:nvPr/>
+          </p:nvSpPr>
+          <p:spPr>
+            <a:xfrm>
+              <a:off x="1895537" y="559590"/>
+              <a:ext cx="69056" cy="73819"/>
+            </a:xfrm>
+            <a:prstGeom prst="star4">
+              <a:avLst/>
+            </a:prstGeom>
+          </p:spPr>
+          <p:style>
+            <a:lnRef idx="2">
+              <a:schemeClr val="accent1">
+                <a:shade val="50000"/>
+              </a:schemeClr>
+            </a:lnRef>
+            <a:fillRef idx="1">
+              <a:schemeClr val="accent1"/>
+            </a:fillRef>
+            <a:effectRef idx="0">
+              <a:schemeClr val="accent1"/>
+            </a:effectRef>
+            <a:fontRef idx="minor">
+              <a:schemeClr val="lt1"/>
+            </a:fontRef>
+          </p:style>
+          <p:txBody>
+            <a:bodyPr rtlCol="1" anchor="ctr"/>
+            <a:lstStyle/>
+            <a:p>
+              <a:pPr algn="ctr"/>
+              <a:endParaRPr lang="he-IL"/>
+            </a:p>
+          </p:txBody>
+        </p:sp>
+        <p:sp>
+          <p:nvSpPr>
+            <p:cNvPr id="280" name="כוכב: 7 פינות 206">
+              <a:extLst>
+                <a:ext uri="{FF2B5EF4-FFF2-40B4-BE49-F238E27FC236}">
+                  <a16:creationId xmlns:a16="http://schemas.microsoft.com/office/drawing/2014/main" id="{AB4ED0FB-588B-4B54-BCC0-E1A597F9260F}"/>
+                </a:ext>
+              </a:extLst>
+            </p:cNvPr>
+            <p:cNvSpPr/>
+            <p:nvPr/>
+          </p:nvSpPr>
+          <p:spPr>
+            <a:xfrm>
+              <a:off x="2040794" y="559589"/>
+              <a:ext cx="69056" cy="73819"/>
+            </a:xfrm>
+            <a:prstGeom prst="star7">
+              <a:avLst/>
+            </a:prstGeom>
+          </p:spPr>
+          <p:style>
+            <a:lnRef idx="2">
+              <a:schemeClr val="accent1">
+                <a:shade val="50000"/>
+              </a:schemeClr>
+            </a:lnRef>
+            <a:fillRef idx="1">
+              <a:schemeClr val="accent1"/>
+            </a:fillRef>
+            <a:effectRef idx="0">
+              <a:schemeClr val="accent1"/>
+            </a:effectRef>
+            <a:fontRef idx="minor">
+              <a:schemeClr val="lt1"/>
+            </a:fontRef>
+          </p:style>
+          <p:txBody>
+            <a:bodyPr rtlCol="1" anchor="ctr"/>
+            <a:lstStyle/>
+            <a:p>
+              <a:pPr algn="ctr"/>
+              <a:endParaRPr lang="he-IL"/>
+            </a:p>
+          </p:txBody>
+        </p:sp>
+        <p:sp>
+          <p:nvSpPr>
+            <p:cNvPr id="281" name="כוכב: 7 פינות 207">
+              <a:extLst>
+                <a:ext uri="{FF2B5EF4-FFF2-40B4-BE49-F238E27FC236}">
+                  <a16:creationId xmlns:a16="http://schemas.microsoft.com/office/drawing/2014/main" id="{BA407F88-1836-4494-BBFD-6F8FB81F97B7}"/>
+                </a:ext>
+              </a:extLst>
+            </p:cNvPr>
+            <p:cNvSpPr/>
+            <p:nvPr/>
+          </p:nvSpPr>
+          <p:spPr>
+            <a:xfrm>
+              <a:off x="1031144" y="704844"/>
+              <a:ext cx="69056" cy="73819"/>
+            </a:xfrm>
+            <a:prstGeom prst="star7">
+              <a:avLst/>
+            </a:prstGeom>
+          </p:spPr>
+          <p:style>
+            <a:lnRef idx="2">
+              <a:schemeClr val="accent1">
+                <a:shade val="50000"/>
+              </a:schemeClr>
+            </a:lnRef>
+            <a:fillRef idx="1">
+              <a:schemeClr val="accent1"/>
+            </a:fillRef>
+            <a:effectRef idx="0">
+              <a:schemeClr val="accent1"/>
+            </a:effectRef>
+            <a:fontRef idx="minor">
+              <a:schemeClr val="lt1"/>
+            </a:fontRef>
+          </p:style>
+          <p:txBody>
+            <a:bodyPr rtlCol="1" anchor="ctr"/>
+            <a:lstStyle/>
+            <a:p>
+              <a:pPr algn="ctr"/>
+              <a:endParaRPr lang="he-IL"/>
+            </a:p>
+          </p:txBody>
+        </p:sp>
+        <p:sp>
+          <p:nvSpPr>
+            <p:cNvPr id="282" name="כוכב: 4 פינות 208">
+              <a:extLst>
+                <a:ext uri="{FF2B5EF4-FFF2-40B4-BE49-F238E27FC236}">
+                  <a16:creationId xmlns:a16="http://schemas.microsoft.com/office/drawing/2014/main" id="{5C591D91-89D6-4CB6-A34B-4754B03A624C}"/>
+                </a:ext>
+              </a:extLst>
+            </p:cNvPr>
+            <p:cNvSpPr/>
+            <p:nvPr/>
+          </p:nvSpPr>
+          <p:spPr>
+            <a:xfrm>
+              <a:off x="1174018" y="704845"/>
+              <a:ext cx="69056" cy="73819"/>
+            </a:xfrm>
+            <a:prstGeom prst="star4">
+              <a:avLst/>
+            </a:prstGeom>
+          </p:spPr>
+          <p:style>
+            <a:lnRef idx="2">
+              <a:schemeClr val="accent1">
+                <a:shade val="50000"/>
+              </a:schemeClr>
+            </a:lnRef>
+            <a:fillRef idx="1">
+              <a:schemeClr val="accent1"/>
+            </a:fillRef>
+            <a:effectRef idx="0">
+              <a:schemeClr val="accent1"/>
+            </a:effectRef>
+            <a:fontRef idx="minor">
+              <a:schemeClr val="lt1"/>
+            </a:fontRef>
+          </p:style>
+          <p:txBody>
+            <a:bodyPr rtlCol="1" anchor="ctr"/>
+            <a:lstStyle/>
+            <a:p>
+              <a:pPr algn="ctr"/>
+              <a:endParaRPr lang="he-IL"/>
+            </a:p>
+          </p:txBody>
+        </p:sp>
+        <p:sp>
+          <p:nvSpPr>
+            <p:cNvPr id="283" name="כוכב: 7 פינות 209">
+              <a:extLst>
+                <a:ext uri="{FF2B5EF4-FFF2-40B4-BE49-F238E27FC236}">
+                  <a16:creationId xmlns:a16="http://schemas.microsoft.com/office/drawing/2014/main" id="{714136A9-80DE-4AA5-812D-87CD566F7354}"/>
+                </a:ext>
+              </a:extLst>
+            </p:cNvPr>
+            <p:cNvSpPr/>
+            <p:nvPr/>
+          </p:nvSpPr>
+          <p:spPr>
+            <a:xfrm>
+              <a:off x="1319275" y="704844"/>
+              <a:ext cx="69056" cy="73819"/>
+            </a:xfrm>
+            <a:prstGeom prst="star7">
+              <a:avLst/>
+            </a:prstGeom>
+          </p:spPr>
+          <p:style>
+            <a:lnRef idx="2">
+              <a:schemeClr val="accent1">
+                <a:shade val="50000"/>
+              </a:schemeClr>
+            </a:lnRef>
+            <a:fillRef idx="1">
+              <a:schemeClr val="accent1"/>
+            </a:fillRef>
+            <a:effectRef idx="0">
+              <a:schemeClr val="accent1"/>
+            </a:effectRef>
+            <a:fontRef idx="minor">
+              <a:schemeClr val="lt1"/>
+            </a:fontRef>
+          </p:style>
+          <p:txBody>
+            <a:bodyPr rtlCol="1" anchor="ctr"/>
+            <a:lstStyle/>
+            <a:p>
+              <a:pPr algn="ctr"/>
+              <a:endParaRPr lang="he-IL"/>
+            </a:p>
+          </p:txBody>
+        </p:sp>
+        <p:sp>
+          <p:nvSpPr>
+            <p:cNvPr id="284" name="כוכב: 4 פינות 210">
+              <a:extLst>
+                <a:ext uri="{FF2B5EF4-FFF2-40B4-BE49-F238E27FC236}">
+                  <a16:creationId xmlns:a16="http://schemas.microsoft.com/office/drawing/2014/main" id="{E66A9296-6367-40F1-85CF-C60C04CFF283}"/>
+                </a:ext>
+              </a:extLst>
+            </p:cNvPr>
+            <p:cNvSpPr/>
+            <p:nvPr/>
+          </p:nvSpPr>
+          <p:spPr>
+            <a:xfrm>
+              <a:off x="1462149" y="704845"/>
+              <a:ext cx="69056" cy="73819"/>
+            </a:xfrm>
+            <a:prstGeom prst="star4">
+              <a:avLst/>
+            </a:prstGeom>
+          </p:spPr>
+          <p:style>
+            <a:lnRef idx="2">
+              <a:schemeClr val="accent1">
+                <a:shade val="50000"/>
+              </a:schemeClr>
+            </a:lnRef>
+            <a:fillRef idx="1">
+              <a:schemeClr val="accent1"/>
+            </a:fillRef>
+            <a:effectRef idx="0">
+              <a:schemeClr val="accent1"/>
+            </a:effectRef>
+            <a:fontRef idx="minor">
+              <a:schemeClr val="lt1"/>
+            </a:fontRef>
+          </p:style>
+          <p:txBody>
+            <a:bodyPr rtlCol="1" anchor="ctr"/>
+            <a:lstStyle/>
+            <a:p>
+              <a:pPr algn="ctr"/>
+              <a:endParaRPr lang="he-IL"/>
+            </a:p>
+          </p:txBody>
+        </p:sp>
+        <p:sp>
+          <p:nvSpPr>
+            <p:cNvPr id="285" name="כוכב: 7 פינות 211">
+              <a:extLst>
+                <a:ext uri="{FF2B5EF4-FFF2-40B4-BE49-F238E27FC236}">
+                  <a16:creationId xmlns:a16="http://schemas.microsoft.com/office/drawing/2014/main" id="{D4091CA4-81CA-4EF1-BF7B-3F86644A1673}"/>
+                </a:ext>
+              </a:extLst>
+            </p:cNvPr>
+            <p:cNvSpPr/>
+            <p:nvPr/>
+          </p:nvSpPr>
+          <p:spPr>
+            <a:xfrm>
+              <a:off x="1607406" y="704844"/>
+              <a:ext cx="69056" cy="73819"/>
+            </a:xfrm>
+            <a:prstGeom prst="star7">
+              <a:avLst/>
+            </a:prstGeom>
+          </p:spPr>
+          <p:style>
+            <a:lnRef idx="2">
+              <a:schemeClr val="accent1">
+                <a:shade val="50000"/>
+              </a:schemeClr>
+            </a:lnRef>
+            <a:fillRef idx="1">
+              <a:schemeClr val="accent1"/>
+            </a:fillRef>
+            <a:effectRef idx="0">
+              <a:schemeClr val="accent1"/>
+            </a:effectRef>
+            <a:fontRef idx="minor">
+              <a:schemeClr val="lt1"/>
+            </a:fontRef>
+          </p:style>
+          <p:txBody>
+            <a:bodyPr rtlCol="1" anchor="ctr"/>
+            <a:lstStyle/>
+            <a:p>
+              <a:pPr algn="ctr"/>
+              <a:endParaRPr lang="he-IL"/>
+            </a:p>
+          </p:txBody>
+        </p:sp>
+        <p:sp>
+          <p:nvSpPr>
+            <p:cNvPr id="286" name="כוכב: 4 פינות 212">
+              <a:extLst>
+                <a:ext uri="{FF2B5EF4-FFF2-40B4-BE49-F238E27FC236}">
+                  <a16:creationId xmlns:a16="http://schemas.microsoft.com/office/drawing/2014/main" id="{AFF15E81-496A-47D7-A418-544BC6FC5323}"/>
+                </a:ext>
+              </a:extLst>
+            </p:cNvPr>
+            <p:cNvSpPr/>
+            <p:nvPr/>
+          </p:nvSpPr>
+          <p:spPr>
+            <a:xfrm>
+              <a:off x="1750280" y="704845"/>
+              <a:ext cx="69056" cy="73819"/>
+            </a:xfrm>
+            <a:prstGeom prst="star4">
+              <a:avLst/>
+            </a:prstGeom>
+          </p:spPr>
+          <p:style>
+            <a:lnRef idx="2">
+              <a:schemeClr val="accent1">
+                <a:shade val="50000"/>
+              </a:schemeClr>
+            </a:lnRef>
+            <a:fillRef idx="1">
+              <a:schemeClr val="accent1"/>
+            </a:fillRef>
+            <a:effectRef idx="0">
+              <a:schemeClr val="accent1"/>
+            </a:effectRef>
+            <a:fontRef idx="minor">
+              <a:schemeClr val="lt1"/>
+            </a:fontRef>
+          </p:style>
+          <p:txBody>
+            <a:bodyPr rtlCol="1" anchor="ctr"/>
+            <a:lstStyle/>
+            <a:p>
+              <a:pPr algn="ctr"/>
+              <a:endParaRPr lang="he-IL"/>
+            </a:p>
+          </p:txBody>
+        </p:sp>
+        <p:sp>
+          <p:nvSpPr>
+            <p:cNvPr id="287" name="כוכב: 7 פינות 213">
+              <a:extLst>
+                <a:ext uri="{FF2B5EF4-FFF2-40B4-BE49-F238E27FC236}">
+                  <a16:creationId xmlns:a16="http://schemas.microsoft.com/office/drawing/2014/main" id="{CC02F420-4B9D-4CC2-A792-46726C1877D3}"/>
+                </a:ext>
+              </a:extLst>
+            </p:cNvPr>
+            <p:cNvSpPr/>
+            <p:nvPr/>
+          </p:nvSpPr>
+          <p:spPr>
+            <a:xfrm>
+              <a:off x="1895537" y="704844"/>
+              <a:ext cx="69056" cy="73819"/>
+            </a:xfrm>
+            <a:prstGeom prst="star7">
+              <a:avLst/>
+            </a:prstGeom>
+          </p:spPr>
+          <p:style>
+            <a:lnRef idx="2">
+              <a:schemeClr val="accent1">
+                <a:shade val="50000"/>
+              </a:schemeClr>
+            </a:lnRef>
+            <a:fillRef idx="1">
+              <a:schemeClr val="accent1"/>
+            </a:fillRef>
+            <a:effectRef idx="0">
+              <a:schemeClr val="accent1"/>
+            </a:effectRef>
+            <a:fontRef idx="minor">
+              <a:schemeClr val="lt1"/>
+            </a:fontRef>
+          </p:style>
+          <p:txBody>
+            <a:bodyPr rtlCol="1" anchor="ctr"/>
+            <a:lstStyle/>
+            <a:p>
+              <a:pPr algn="ctr"/>
+              <a:endParaRPr lang="he-IL"/>
+            </a:p>
+          </p:txBody>
+        </p:sp>
+        <p:sp>
+          <p:nvSpPr>
+            <p:cNvPr id="288" name="כוכב: 4 פינות 214">
+              <a:extLst>
+                <a:ext uri="{FF2B5EF4-FFF2-40B4-BE49-F238E27FC236}">
+                  <a16:creationId xmlns:a16="http://schemas.microsoft.com/office/drawing/2014/main" id="{ADD1F078-D2EC-4B45-981F-0F68F4534BF4}"/>
+                </a:ext>
+              </a:extLst>
+            </p:cNvPr>
+            <p:cNvSpPr/>
+            <p:nvPr/>
+          </p:nvSpPr>
+          <p:spPr>
+            <a:xfrm>
+              <a:off x="2038411" y="704845"/>
+              <a:ext cx="69056" cy="73819"/>
+            </a:xfrm>
+            <a:prstGeom prst="star4">
+              <a:avLst/>
+            </a:prstGeom>
+          </p:spPr>
+          <p:style>
+            <a:lnRef idx="2">
+              <a:schemeClr val="accent1">
+                <a:shade val="50000"/>
+              </a:schemeClr>
+            </a:lnRef>
+            <a:fillRef idx="1">
+              <a:schemeClr val="accent1"/>
+            </a:fillRef>
+            <a:effectRef idx="0">
+              <a:schemeClr val="accent1"/>
+            </a:effectRef>
+            <a:fontRef idx="minor">
+              <a:schemeClr val="lt1"/>
+            </a:fontRef>
+          </p:style>
+          <p:txBody>
+            <a:bodyPr rtlCol="1" anchor="ctr"/>
+            <a:lstStyle/>
+            <a:p>
+              <a:pPr algn="ctr"/>
+              <a:endParaRPr lang="he-IL"/>
+            </a:p>
+          </p:txBody>
+        </p:sp>
+        <p:sp>
+          <p:nvSpPr>
+            <p:cNvPr id="289" name="כוכב: 4 פינות 215">
+              <a:extLst>
+                <a:ext uri="{FF2B5EF4-FFF2-40B4-BE49-F238E27FC236}">
+                  <a16:creationId xmlns:a16="http://schemas.microsoft.com/office/drawing/2014/main" id="{E66204DA-A1A5-446B-8F37-D24E1E9189B8}"/>
+                </a:ext>
+              </a:extLst>
+            </p:cNvPr>
+            <p:cNvSpPr/>
+            <p:nvPr/>
+          </p:nvSpPr>
+          <p:spPr>
+            <a:xfrm>
+              <a:off x="1031144" y="850099"/>
+              <a:ext cx="69056" cy="73819"/>
+            </a:xfrm>
+            <a:prstGeom prst="star4">
+              <a:avLst/>
+            </a:prstGeom>
+          </p:spPr>
+          <p:style>
+            <a:lnRef idx="2">
+              <a:schemeClr val="accent1">
+                <a:shade val="50000"/>
+              </a:schemeClr>
+            </a:lnRef>
+            <a:fillRef idx="1">
+              <a:schemeClr val="accent1"/>
+            </a:fillRef>
+            <a:effectRef idx="0">
+              <a:schemeClr val="accent1"/>
+            </a:effectRef>
+            <a:fontRef idx="minor">
+              <a:schemeClr val="lt1"/>
+            </a:fontRef>
+          </p:style>
+          <p:txBody>
+            <a:bodyPr rtlCol="1" anchor="ctr"/>
+            <a:lstStyle/>
+            <a:p>
+              <a:pPr algn="ctr"/>
+              <a:endParaRPr lang="he-IL"/>
+            </a:p>
+          </p:txBody>
+        </p:sp>
+        <p:sp>
+          <p:nvSpPr>
+            <p:cNvPr id="290" name="כוכב: 7 פינות 216">
+              <a:extLst>
+                <a:ext uri="{FF2B5EF4-FFF2-40B4-BE49-F238E27FC236}">
+                  <a16:creationId xmlns:a16="http://schemas.microsoft.com/office/drawing/2014/main" id="{851FD0C0-4801-4C52-928A-2655EFF6999C}"/>
+                </a:ext>
+              </a:extLst>
+            </p:cNvPr>
+            <p:cNvSpPr/>
+            <p:nvPr/>
+          </p:nvSpPr>
+          <p:spPr>
+            <a:xfrm>
+              <a:off x="1176401" y="850098"/>
+              <a:ext cx="69056" cy="73819"/>
+            </a:xfrm>
+            <a:prstGeom prst="star7">
+              <a:avLst/>
+            </a:prstGeom>
+          </p:spPr>
+          <p:style>
+            <a:lnRef idx="2">
+              <a:schemeClr val="accent1">
+                <a:shade val="50000"/>
+              </a:schemeClr>
+            </a:lnRef>
+            <a:fillRef idx="1">
+              <a:schemeClr val="accent1"/>
+            </a:fillRef>
+            <a:effectRef idx="0">
+              <a:schemeClr val="accent1"/>
+            </a:effectRef>
+            <a:fontRef idx="minor">
+              <a:schemeClr val="lt1"/>
+            </a:fontRef>
+          </p:style>
+          <p:txBody>
+            <a:bodyPr rtlCol="1" anchor="ctr"/>
+            <a:lstStyle/>
+            <a:p>
+              <a:pPr algn="ctr"/>
+              <a:endParaRPr lang="he-IL"/>
+            </a:p>
+          </p:txBody>
+        </p:sp>
+        <p:sp>
+          <p:nvSpPr>
+            <p:cNvPr id="291" name="כוכב: 4 פינות 217">
+              <a:extLst>
+                <a:ext uri="{FF2B5EF4-FFF2-40B4-BE49-F238E27FC236}">
+                  <a16:creationId xmlns:a16="http://schemas.microsoft.com/office/drawing/2014/main" id="{860E6284-ACE9-484E-8FB5-22EBA8B6C704}"/>
+                </a:ext>
+              </a:extLst>
+            </p:cNvPr>
+            <p:cNvSpPr/>
+            <p:nvPr/>
+          </p:nvSpPr>
+          <p:spPr>
+            <a:xfrm>
+              <a:off x="1319275" y="850099"/>
+              <a:ext cx="69056" cy="73819"/>
+            </a:xfrm>
+            <a:prstGeom prst="star4">
+              <a:avLst/>
+            </a:prstGeom>
+          </p:spPr>
+          <p:style>
+            <a:lnRef idx="2">
+              <a:schemeClr val="accent1">
+                <a:shade val="50000"/>
+              </a:schemeClr>
+            </a:lnRef>
+            <a:fillRef idx="1">
+              <a:schemeClr val="accent1"/>
+            </a:fillRef>
+            <a:effectRef idx="0">
+              <a:schemeClr val="accent1"/>
+            </a:effectRef>
+            <a:fontRef idx="minor">
+              <a:schemeClr val="lt1"/>
+            </a:fontRef>
+          </p:style>
+          <p:txBody>
+            <a:bodyPr rtlCol="1" anchor="ctr"/>
+            <a:lstStyle/>
+            <a:p>
+              <a:pPr algn="ctr"/>
+              <a:endParaRPr lang="he-IL"/>
+            </a:p>
+          </p:txBody>
+        </p:sp>
+        <p:sp>
+          <p:nvSpPr>
+            <p:cNvPr id="292" name="כוכב: 7 פינות 218">
+              <a:extLst>
+                <a:ext uri="{FF2B5EF4-FFF2-40B4-BE49-F238E27FC236}">
+                  <a16:creationId xmlns:a16="http://schemas.microsoft.com/office/drawing/2014/main" id="{08798CE4-CAB1-45E4-8722-14FAB4128F15}"/>
+                </a:ext>
+              </a:extLst>
+            </p:cNvPr>
+            <p:cNvSpPr/>
+            <p:nvPr/>
+          </p:nvSpPr>
+          <p:spPr>
+            <a:xfrm>
+              <a:off x="1464532" y="850098"/>
+              <a:ext cx="69056" cy="73819"/>
+            </a:xfrm>
+            <a:prstGeom prst="star7">
+              <a:avLst/>
+            </a:prstGeom>
+          </p:spPr>
+          <p:style>
+            <a:lnRef idx="2">
+              <a:schemeClr val="accent1">
+                <a:shade val="50000"/>
+              </a:schemeClr>
+            </a:lnRef>
+            <a:fillRef idx="1">
+              <a:schemeClr val="accent1"/>
+            </a:fillRef>
+            <a:effectRef idx="0">
+              <a:schemeClr val="accent1"/>
+            </a:effectRef>
+            <a:fontRef idx="minor">
+              <a:schemeClr val="lt1"/>
+            </a:fontRef>
+          </p:style>
+          <p:txBody>
+            <a:bodyPr rtlCol="1" anchor="ctr"/>
+            <a:lstStyle/>
+            <a:p>
+              <a:pPr algn="ctr"/>
+              <a:endParaRPr lang="he-IL"/>
+            </a:p>
+          </p:txBody>
+        </p:sp>
+        <p:sp>
+          <p:nvSpPr>
+            <p:cNvPr id="293" name="כוכב: 4 פינות 219">
+              <a:extLst>
+                <a:ext uri="{FF2B5EF4-FFF2-40B4-BE49-F238E27FC236}">
+                  <a16:creationId xmlns:a16="http://schemas.microsoft.com/office/drawing/2014/main" id="{7DDC3D98-106E-4DBF-8FC8-5A72A1C039FA}"/>
+                </a:ext>
+              </a:extLst>
+            </p:cNvPr>
+            <p:cNvSpPr/>
+            <p:nvPr/>
+          </p:nvSpPr>
+          <p:spPr>
+            <a:xfrm>
+              <a:off x="1607406" y="850099"/>
+              <a:ext cx="69056" cy="73819"/>
+            </a:xfrm>
+            <a:prstGeom prst="star4">
+              <a:avLst/>
+            </a:prstGeom>
+          </p:spPr>
+          <p:style>
+            <a:lnRef idx="2">
+              <a:schemeClr val="accent1">
+                <a:shade val="50000"/>
+              </a:schemeClr>
+            </a:lnRef>
+            <a:fillRef idx="1">
+              <a:schemeClr val="accent1"/>
+            </a:fillRef>
+            <a:effectRef idx="0">
+              <a:schemeClr val="accent1"/>
+            </a:effectRef>
+            <a:fontRef idx="minor">
+              <a:schemeClr val="lt1"/>
+            </a:fontRef>
+          </p:style>
+          <p:txBody>
+            <a:bodyPr rtlCol="1" anchor="ctr"/>
+            <a:lstStyle/>
+            <a:p>
+              <a:pPr algn="ctr"/>
+              <a:endParaRPr lang="he-IL"/>
+            </a:p>
+          </p:txBody>
+        </p:sp>
+        <p:sp>
+          <p:nvSpPr>
+            <p:cNvPr id="294" name="כוכב: 7 פינות 220">
+              <a:extLst>
+                <a:ext uri="{FF2B5EF4-FFF2-40B4-BE49-F238E27FC236}">
+                  <a16:creationId xmlns:a16="http://schemas.microsoft.com/office/drawing/2014/main" id="{2C63A5CD-734F-4949-8AC0-0266C84066CD}"/>
+                </a:ext>
+              </a:extLst>
+            </p:cNvPr>
+            <p:cNvSpPr/>
+            <p:nvPr/>
+          </p:nvSpPr>
+          <p:spPr>
+            <a:xfrm>
+              <a:off x="1752663" y="850098"/>
+              <a:ext cx="69056" cy="73819"/>
+            </a:xfrm>
+            <a:prstGeom prst="star7">
+              <a:avLst/>
+            </a:prstGeom>
+          </p:spPr>
+          <p:style>
+            <a:lnRef idx="2">
+              <a:schemeClr val="accent1">
+                <a:shade val="50000"/>
+              </a:schemeClr>
+            </a:lnRef>
+            <a:fillRef idx="1">
+              <a:schemeClr val="accent1"/>
+            </a:fillRef>
+            <a:effectRef idx="0">
+              <a:schemeClr val="accent1"/>
+            </a:effectRef>
+            <a:fontRef idx="minor">
+              <a:schemeClr val="lt1"/>
+            </a:fontRef>
+          </p:style>
+          <p:txBody>
+            <a:bodyPr rtlCol="1" anchor="ctr"/>
+            <a:lstStyle/>
+            <a:p>
+              <a:pPr algn="ctr"/>
+              <a:endParaRPr lang="he-IL"/>
+            </a:p>
+          </p:txBody>
+        </p:sp>
+        <p:sp>
+          <p:nvSpPr>
+            <p:cNvPr id="295" name="כוכב: 4 פינות 221">
+              <a:extLst>
+                <a:ext uri="{FF2B5EF4-FFF2-40B4-BE49-F238E27FC236}">
+                  <a16:creationId xmlns:a16="http://schemas.microsoft.com/office/drawing/2014/main" id="{8555E0A4-41E2-4652-AA15-61C86FAB340D}"/>
+                </a:ext>
+              </a:extLst>
+            </p:cNvPr>
+            <p:cNvSpPr/>
+            <p:nvPr/>
+          </p:nvSpPr>
+          <p:spPr>
+            <a:xfrm>
+              <a:off x="1895537" y="850099"/>
+              <a:ext cx="69056" cy="73819"/>
+            </a:xfrm>
+            <a:prstGeom prst="star4">
+              <a:avLst/>
+            </a:prstGeom>
+          </p:spPr>
+          <p:style>
+            <a:lnRef idx="2">
+              <a:schemeClr val="accent1">
+                <a:shade val="50000"/>
+              </a:schemeClr>
+            </a:lnRef>
+            <a:fillRef idx="1">
+              <a:schemeClr val="accent1"/>
+            </a:fillRef>
+            <a:effectRef idx="0">
+              <a:schemeClr val="accent1"/>
+            </a:effectRef>
+            <a:fontRef idx="minor">
+              <a:schemeClr val="lt1"/>
+            </a:fontRef>
+          </p:style>
+          <p:txBody>
+            <a:bodyPr rtlCol="1" anchor="ctr"/>
+            <a:lstStyle/>
+            <a:p>
+              <a:pPr algn="ctr"/>
+              <a:endParaRPr lang="he-IL"/>
+            </a:p>
+          </p:txBody>
+        </p:sp>
+        <p:sp>
+          <p:nvSpPr>
+            <p:cNvPr id="296" name="כוכב: 7 פינות 222">
+              <a:extLst>
+                <a:ext uri="{FF2B5EF4-FFF2-40B4-BE49-F238E27FC236}">
+                  <a16:creationId xmlns:a16="http://schemas.microsoft.com/office/drawing/2014/main" id="{5EC65030-80DB-453D-9725-476BB8F3ABC5}"/>
+                </a:ext>
+              </a:extLst>
+            </p:cNvPr>
+            <p:cNvSpPr/>
+            <p:nvPr/>
+          </p:nvSpPr>
+          <p:spPr>
+            <a:xfrm>
+              <a:off x="2040794" y="850098"/>
+              <a:ext cx="69056" cy="73819"/>
+            </a:xfrm>
+            <a:prstGeom prst="star7">
+              <a:avLst/>
+            </a:prstGeom>
+          </p:spPr>
+          <p:style>
+            <a:lnRef idx="2">
+              <a:schemeClr val="accent1">
+                <a:shade val="50000"/>
+              </a:schemeClr>
+            </a:lnRef>
+            <a:fillRef idx="1">
+              <a:schemeClr val="accent1"/>
+            </a:fillRef>
+            <a:effectRef idx="0">
+              <a:schemeClr val="accent1"/>
+            </a:effectRef>
+            <a:fontRef idx="minor">
+              <a:schemeClr val="lt1"/>
+            </a:fontRef>
+          </p:style>
+          <p:txBody>
+            <a:bodyPr rtlCol="1" anchor="ctr"/>
+            <a:lstStyle/>
+            <a:p>
+              <a:pPr algn="ctr"/>
+              <a:endParaRPr lang="he-IL"/>
+            </a:p>
+          </p:txBody>
+        </p:sp>
+        <p:sp>
+          <p:nvSpPr>
+            <p:cNvPr id="297" name="כוכב: 7 פינות 223">
+              <a:extLst>
+                <a:ext uri="{FF2B5EF4-FFF2-40B4-BE49-F238E27FC236}">
+                  <a16:creationId xmlns:a16="http://schemas.microsoft.com/office/drawing/2014/main" id="{8AE27B0D-3D6B-4E9E-BA9C-3CCA43E0DBFE}"/>
+                </a:ext>
+              </a:extLst>
+            </p:cNvPr>
+            <p:cNvSpPr/>
+            <p:nvPr/>
+          </p:nvSpPr>
+          <p:spPr>
+            <a:xfrm>
+              <a:off x="1031144" y="995353"/>
+              <a:ext cx="69056" cy="73819"/>
+            </a:xfrm>
+            <a:prstGeom prst="star7">
+              <a:avLst/>
+            </a:prstGeom>
+          </p:spPr>
+          <p:style>
+            <a:lnRef idx="2">
+              <a:schemeClr val="accent1">
+                <a:shade val="50000"/>
+              </a:schemeClr>
+            </a:lnRef>
+            <a:fillRef idx="1">
+              <a:schemeClr val="accent1"/>
+            </a:fillRef>
+            <a:effectRef idx="0">
+              <a:schemeClr val="accent1"/>
+            </a:effectRef>
+            <a:fontRef idx="minor">
+              <a:schemeClr val="lt1"/>
+            </a:fontRef>
+          </p:style>
+          <p:txBody>
+            <a:bodyPr rtlCol="1" anchor="ctr"/>
+            <a:lstStyle/>
+            <a:p>
+              <a:pPr algn="ctr"/>
+              <a:endParaRPr lang="he-IL"/>
+            </a:p>
+          </p:txBody>
+        </p:sp>
+        <p:sp>
+          <p:nvSpPr>
+            <p:cNvPr id="298" name="כוכב: 4 פינות 224">
+              <a:extLst>
+                <a:ext uri="{FF2B5EF4-FFF2-40B4-BE49-F238E27FC236}">
+                  <a16:creationId xmlns:a16="http://schemas.microsoft.com/office/drawing/2014/main" id="{10654A89-ADD3-47B9-ACD2-EDBAE70D98DE}"/>
+                </a:ext>
+              </a:extLst>
+            </p:cNvPr>
+            <p:cNvSpPr/>
+            <p:nvPr/>
+          </p:nvSpPr>
+          <p:spPr>
+            <a:xfrm>
+              <a:off x="1174018" y="995354"/>
+              <a:ext cx="69056" cy="73819"/>
+            </a:xfrm>
+            <a:prstGeom prst="star4">
+              <a:avLst/>
+            </a:prstGeom>
+          </p:spPr>
+          <p:style>
+            <a:lnRef idx="2">
+              <a:schemeClr val="accent1">
+                <a:shade val="50000"/>
+              </a:schemeClr>
+            </a:lnRef>
+            <a:fillRef idx="1">
+              <a:schemeClr val="accent1"/>
+            </a:fillRef>
+            <a:effectRef idx="0">
+              <a:schemeClr val="accent1"/>
+            </a:effectRef>
+            <a:fontRef idx="minor">
+              <a:schemeClr val="lt1"/>
+            </a:fontRef>
+          </p:style>
+          <p:txBody>
+            <a:bodyPr rtlCol="1" anchor="ctr"/>
+            <a:lstStyle/>
+            <a:p>
+              <a:pPr algn="ctr"/>
+              <a:endParaRPr lang="he-IL"/>
+            </a:p>
+          </p:txBody>
+        </p:sp>
+        <p:sp>
+          <p:nvSpPr>
+            <p:cNvPr id="299" name="כוכב: 7 פינות 225">
+              <a:extLst>
+                <a:ext uri="{FF2B5EF4-FFF2-40B4-BE49-F238E27FC236}">
+                  <a16:creationId xmlns:a16="http://schemas.microsoft.com/office/drawing/2014/main" id="{B5D83B62-EFF2-4DBE-9B8F-39F9DC4CA949}"/>
+                </a:ext>
+              </a:extLst>
+            </p:cNvPr>
+            <p:cNvSpPr/>
+            <p:nvPr/>
+          </p:nvSpPr>
+          <p:spPr>
+            <a:xfrm>
+              <a:off x="1319275" y="995353"/>
+              <a:ext cx="69056" cy="73819"/>
+            </a:xfrm>
+            <a:prstGeom prst="star7">
+              <a:avLst/>
+            </a:prstGeom>
+          </p:spPr>
+          <p:style>
+            <a:lnRef idx="2">
+              <a:schemeClr val="accent1">
+                <a:shade val="50000"/>
+              </a:schemeClr>
+            </a:lnRef>
+            <a:fillRef idx="1">
+              <a:schemeClr val="accent1"/>
+            </a:fillRef>
+            <a:effectRef idx="0">
+              <a:schemeClr val="accent1"/>
+            </a:effectRef>
+            <a:fontRef idx="minor">
+              <a:schemeClr val="lt1"/>
+            </a:fontRef>
+          </p:style>
+          <p:txBody>
+            <a:bodyPr rtlCol="1" anchor="ctr"/>
+            <a:lstStyle/>
+            <a:p>
+              <a:pPr algn="ctr"/>
+              <a:endParaRPr lang="he-IL"/>
+            </a:p>
+          </p:txBody>
+        </p:sp>
+        <p:sp>
+          <p:nvSpPr>
+            <p:cNvPr id="300" name="כוכב: 4 פינות 226">
+              <a:extLst>
+                <a:ext uri="{FF2B5EF4-FFF2-40B4-BE49-F238E27FC236}">
+                  <a16:creationId xmlns:a16="http://schemas.microsoft.com/office/drawing/2014/main" id="{B2549D2F-2812-49AB-AA82-BCD45C16E426}"/>
+                </a:ext>
+              </a:extLst>
+            </p:cNvPr>
+            <p:cNvSpPr/>
+            <p:nvPr/>
+          </p:nvSpPr>
+          <p:spPr>
+            <a:xfrm>
+              <a:off x="1462149" y="995354"/>
+              <a:ext cx="69056" cy="73819"/>
+            </a:xfrm>
+            <a:prstGeom prst="star4">
+              <a:avLst/>
+            </a:prstGeom>
+          </p:spPr>
+          <p:style>
+            <a:lnRef idx="2">
+              <a:schemeClr val="accent1">
+                <a:shade val="50000"/>
+              </a:schemeClr>
+            </a:lnRef>
+            <a:fillRef idx="1">
+              <a:schemeClr val="accent1"/>
+            </a:fillRef>
+            <a:effectRef idx="0">
+              <a:schemeClr val="accent1"/>
+            </a:effectRef>
+            <a:fontRef idx="minor">
+              <a:schemeClr val="lt1"/>
+            </a:fontRef>
+          </p:style>
+          <p:txBody>
+            <a:bodyPr rtlCol="1" anchor="ctr"/>
+            <a:lstStyle/>
+            <a:p>
+              <a:pPr algn="ctr"/>
+              <a:endParaRPr lang="he-IL"/>
+            </a:p>
+          </p:txBody>
+        </p:sp>
+        <p:sp>
+          <p:nvSpPr>
+            <p:cNvPr id="301" name="כוכב: 7 פינות 227">
+              <a:extLst>
+                <a:ext uri="{FF2B5EF4-FFF2-40B4-BE49-F238E27FC236}">
+                  <a16:creationId xmlns:a16="http://schemas.microsoft.com/office/drawing/2014/main" id="{F7DDB967-DE44-4F25-B0DC-20DC6AD82C6B}"/>
+                </a:ext>
+              </a:extLst>
+            </p:cNvPr>
+            <p:cNvSpPr/>
+            <p:nvPr/>
+          </p:nvSpPr>
+          <p:spPr>
+            <a:xfrm>
+              <a:off x="1607406" y="995353"/>
+              <a:ext cx="69056" cy="73819"/>
+            </a:xfrm>
+            <a:prstGeom prst="star7">
+              <a:avLst/>
+            </a:prstGeom>
+          </p:spPr>
+          <p:style>
+            <a:lnRef idx="2">
+              <a:schemeClr val="accent1">
+                <a:shade val="50000"/>
+              </a:schemeClr>
+            </a:lnRef>
+            <a:fillRef idx="1">
+              <a:schemeClr val="accent1"/>
+            </a:fillRef>
+            <a:effectRef idx="0">
+              <a:schemeClr val="accent1"/>
+            </a:effectRef>
+            <a:fontRef idx="minor">
+              <a:schemeClr val="lt1"/>
+            </a:fontRef>
+          </p:style>
+          <p:txBody>
+            <a:bodyPr rtlCol="1" anchor="ctr"/>
+            <a:lstStyle/>
+            <a:p>
+              <a:pPr algn="ctr"/>
+              <a:endParaRPr lang="he-IL"/>
+            </a:p>
+          </p:txBody>
+        </p:sp>
+        <p:sp>
+          <p:nvSpPr>
+            <p:cNvPr id="302" name="כוכב: 4 פינות 228">
+              <a:extLst>
+                <a:ext uri="{FF2B5EF4-FFF2-40B4-BE49-F238E27FC236}">
+                  <a16:creationId xmlns:a16="http://schemas.microsoft.com/office/drawing/2014/main" id="{0B277342-D32B-4EB3-9A30-B0B1C33434E5}"/>
+                </a:ext>
+              </a:extLst>
+            </p:cNvPr>
+            <p:cNvSpPr/>
+            <p:nvPr/>
+          </p:nvSpPr>
+          <p:spPr>
+            <a:xfrm>
+              <a:off x="1750280" y="995354"/>
+              <a:ext cx="69056" cy="73819"/>
+            </a:xfrm>
+            <a:prstGeom prst="star4">
+              <a:avLst/>
+            </a:prstGeom>
+          </p:spPr>
+          <p:style>
+            <a:lnRef idx="2">
+              <a:schemeClr val="accent1">
+                <a:shade val="50000"/>
+              </a:schemeClr>
+            </a:lnRef>
+            <a:fillRef idx="1">
+              <a:schemeClr val="accent1"/>
+            </a:fillRef>
+            <a:effectRef idx="0">
+              <a:schemeClr val="accent1"/>
+            </a:effectRef>
+            <a:fontRef idx="minor">
+              <a:schemeClr val="lt1"/>
+            </a:fontRef>
+          </p:style>
+          <p:txBody>
+            <a:bodyPr rtlCol="1" anchor="ctr"/>
+            <a:lstStyle/>
+            <a:p>
+              <a:pPr algn="ctr"/>
+              <a:endParaRPr lang="he-IL"/>
+            </a:p>
+          </p:txBody>
+        </p:sp>
+        <p:sp>
+          <p:nvSpPr>
+            <p:cNvPr id="303" name="כוכב: 7 פינות 229">
+              <a:extLst>
+                <a:ext uri="{FF2B5EF4-FFF2-40B4-BE49-F238E27FC236}">
+                  <a16:creationId xmlns:a16="http://schemas.microsoft.com/office/drawing/2014/main" id="{282F2953-041F-4B99-B756-6733ED87D2E0}"/>
+                </a:ext>
+              </a:extLst>
+            </p:cNvPr>
+            <p:cNvSpPr/>
+            <p:nvPr/>
+          </p:nvSpPr>
+          <p:spPr>
+            <a:xfrm>
+              <a:off x="1895537" y="995353"/>
+              <a:ext cx="69056" cy="73819"/>
+            </a:xfrm>
+            <a:prstGeom prst="star7">
+              <a:avLst/>
+            </a:prstGeom>
+          </p:spPr>
+          <p:style>
+            <a:lnRef idx="2">
+              <a:schemeClr val="accent1">
+                <a:shade val="50000"/>
+              </a:schemeClr>
+            </a:lnRef>
+            <a:fillRef idx="1">
+              <a:schemeClr val="accent1"/>
+            </a:fillRef>
+            <a:effectRef idx="0">
+              <a:schemeClr val="accent1"/>
+            </a:effectRef>
+            <a:fontRef idx="minor">
+              <a:schemeClr val="lt1"/>
+            </a:fontRef>
+          </p:style>
+          <p:txBody>
+            <a:bodyPr rtlCol="1" anchor="ctr"/>
+            <a:lstStyle/>
+            <a:p>
+              <a:pPr algn="ctr"/>
+              <a:endParaRPr lang="he-IL"/>
+            </a:p>
+          </p:txBody>
+        </p:sp>
+        <p:sp>
+          <p:nvSpPr>
+            <p:cNvPr id="304" name="כוכב: 4 פינות 230">
+              <a:extLst>
+                <a:ext uri="{FF2B5EF4-FFF2-40B4-BE49-F238E27FC236}">
+                  <a16:creationId xmlns:a16="http://schemas.microsoft.com/office/drawing/2014/main" id="{7BE5709F-B8A4-424C-B18D-E27B88981731}"/>
+                </a:ext>
+              </a:extLst>
+            </p:cNvPr>
+            <p:cNvSpPr/>
+            <p:nvPr/>
+          </p:nvSpPr>
+          <p:spPr>
+            <a:xfrm>
+              <a:off x="2038411" y="995354"/>
+              <a:ext cx="69056" cy="73819"/>
+            </a:xfrm>
+            <a:prstGeom prst="star4">
+              <a:avLst/>
+            </a:prstGeom>
+          </p:spPr>
+          <p:style>
+            <a:lnRef idx="2">
+              <a:schemeClr val="accent1">
+                <a:shade val="50000"/>
+              </a:schemeClr>
+            </a:lnRef>
+            <a:fillRef idx="1">
+              <a:schemeClr val="accent1"/>
+            </a:fillRef>
+            <a:effectRef idx="0">
+              <a:schemeClr val="accent1"/>
+            </a:effectRef>
+            <a:fontRef idx="minor">
+              <a:schemeClr val="lt1"/>
+            </a:fontRef>
+          </p:style>
+          <p:txBody>
+            <a:bodyPr rtlCol="1" anchor="ctr"/>
+            <a:lstStyle/>
+            <a:p>
+              <a:pPr algn="ctr"/>
+              <a:endParaRPr lang="he-IL"/>
+            </a:p>
+          </p:txBody>
+        </p:sp>
+      </p:grpSp>
     </p:spTree>
     <p:extLst>
       <p:ext uri="{BB962C8B-B14F-4D97-AF65-F5344CB8AC3E}">

</xml_diff>